<commit_message>
review period tasks updated
</commit_message>
<xml_diff>
--- a/Presentation (2).pptx
+++ b/Presentation (2).pptx
@@ -246,7 +246,7 @@
           <a:p>
             <a:fld id="{45836172-A5A2-4FAA-8BEC-56A50233B81C}" type="datetimeFigureOut">
               <a:rPr lang="en-IN"/>
-              <a:t>18-05-2021</a:t>
+              <a:t>19-05-21</a:t>
             </a:fld>
             <a:endParaRPr lang="en-IN">
               <a:latin typeface="Century Gothic" panose="020B0502020202020204" pitchFamily="34" charset="0"/>
@@ -837,7 +837,7 @@
           <a:p>
             <a:fld id="{269EDF31-0AA9-4E87-A4B9-57332CCA31E6}" type="datetime1">
               <a:rPr lang="en-US"/>
-              <a:t>5/18/2021</a:t>
+              <a:t>5/19/2021</a:t>
             </a:fld>
             <a:endParaRPr lang="en-US" dirty="0"/>
           </a:p>
@@ -1148,7 +1148,7 @@
           <a:p>
             <a:fld id="{F520CF14-AE87-4B5E-98DA-8FDFA0B6E6E8}" type="datetime1">
               <a:rPr lang="en-US"/>
-              <a:t>5/18/2021</a:t>
+              <a:t>5/19/2021</a:t>
             </a:fld>
             <a:endParaRPr lang="en-US" dirty="0"/>
           </a:p>
@@ -1487,7 +1487,7 @@
           <a:p>
             <a:fld id="{27F6E010-57F9-4DEE-BE75-F010064F6923}" type="datetime1">
               <a:rPr lang="en-US"/>
-              <a:t>5/18/2021</a:t>
+              <a:t>5/19/2021</a:t>
             </a:fld>
             <a:endParaRPr lang="en-US" dirty="0"/>
           </a:p>
@@ -1902,7 +1902,7 @@
           <a:p>
             <a:fld id="{1729EFD9-F9B4-4E89-8111-1669A015614B}" type="datetime1">
               <a:rPr lang="en-US"/>
-              <a:t>5/18/2021</a:t>
+              <a:t>5/19/2021</a:t>
             </a:fld>
             <a:endParaRPr lang="en-US" dirty="0"/>
           </a:p>
@@ -2269,7 +2269,7 @@
           <a:p>
             <a:fld id="{8F1791C9-C8A7-4CD7-8F02-677F7D07E350}" type="datetime1">
               <a:rPr lang="en-US"/>
-              <a:t>5/18/2021</a:t>
+              <a:t>5/19/2021</a:t>
             </a:fld>
             <a:endParaRPr lang="en-US" dirty="0"/>
           </a:p>
@@ -2750,7 +2750,7 @@
           <a:p>
             <a:fld id="{AD07E6C9-F3E2-4467-BD21-BEB4EA8666C1}" type="datetime1">
               <a:rPr lang="en-US"/>
-              <a:t>5/18/2021</a:t>
+              <a:t>5/19/2021</a:t>
             </a:fld>
             <a:endParaRPr lang="en-US" dirty="0"/>
           </a:p>
@@ -3081,7 +3081,7 @@
           <a:p>
             <a:fld id="{AD7406EA-F085-4139-9244-7630B1860CA3}" type="datetime1">
               <a:rPr lang="en-US"/>
-              <a:t>5/18/2021</a:t>
+              <a:t>5/19/2021</a:t>
             </a:fld>
             <a:endParaRPr lang="en-US" dirty="0"/>
           </a:p>
@@ -3685,7 +3685,7 @@
           <a:p>
             <a:fld id="{BB962C8B-B14F-4D97-AF65-F5344CB8AC3E}" type="datetime1">
               <a:rPr lang="en-US" altLang="zh-CN"/>
-              <a:t>5/18/2021</a:t>
+              <a:t>5/19/2021</a:t>
             </a:fld>
             <a:endParaRPr lang="en-US" altLang="zh-CN"/>
           </a:p>
@@ -3842,7 +3842,7 @@
         <p:spPr bwMode="auto">
           <a:xfrm>
             <a:off x="3177223" y="3505518"/>
-            <a:ext cx="4714875" cy="708025"/>
+            <a:ext cx="4714875" cy="707886"/>
           </a:xfrm>
           <a:prstGeom prst="rect">
             <a:avLst/>
@@ -3897,11 +3897,44 @@
               </a:rPr>
               <a:t>Abhijna Shetty :1RN19CS002</a:t>
             </a:r>
-            <a:endParaRPr lang="en-IN" altLang="en-US" sz="2000" b="1" dirty="0">
-              <a:solidFill>
-                <a:srgbClr val="002060"/>
-              </a:solidFill>
-            </a:endParaRPr>
+          </a:p>
+        </p:txBody>
+      </p:sp>
+      <p:sp>
+        <p:nvSpPr>
+          <p:cNvPr id="8" name="TextBox 7">
+            <a:extLst>
+              <a:ext uri="{FF2B5EF4-FFF2-40B4-BE49-F238E27FC236}">
+                <a16:creationId xmlns:a16="http://schemas.microsoft.com/office/drawing/2014/main" id="{8A5038F9-30D9-49A1-9129-A4BEEB316523}"/>
+              </a:ext>
+            </a:extLst>
+          </p:cNvPr>
+          <p:cNvSpPr txBox="1"/>
+          <p:nvPr/>
+        </p:nvSpPr>
+        <p:spPr>
+          <a:xfrm>
+            <a:off x="4002384" y="4411008"/>
+            <a:ext cx="3064551" cy="369332"/>
+          </a:xfrm>
+          <a:prstGeom prst="rect">
+            <a:avLst/>
+          </a:prstGeom>
+          <a:noFill/>
+        </p:spPr>
+        <p:txBody>
+          <a:bodyPr wrap="square">
+            <a:spAutoFit/>
+          </a:bodyPr>
+          <a:lstStyle/>
+          <a:p>
+            <a:r>
+              <a:rPr lang="en-IN" dirty="0">
+                <a:hlinkClick r:id="rId2"/>
+              </a:rPr>
+              <a:t>Github Link to the Project </a:t>
+            </a:r>
+            <a:endParaRPr lang="en-IN" dirty="0"/>
           </a:p>
         </p:txBody>
       </p:sp>
@@ -4006,7 +4039,7 @@
             <a:pPr fontAlgn="base"/>
             <a:fld id="{66303338-9798-4197-B188-6DA800031F50}" type="datetime1">
               <a:rPr lang="en-US" altLang="zh-CN"/>
-              <a:t>5/18/2021</a:t>
+              <a:t>5/19/2021</a:t>
             </a:fld>
             <a:endParaRPr lang="en-US" altLang="zh-CN"/>
           </a:p>
@@ -4164,7 +4197,7 @@
             <a:pPr fontAlgn="base"/>
             <a:fld id="{66303338-9798-4197-B188-6DA800031F50}" type="datetime1">
               <a:rPr lang="en-US" altLang="zh-CN"/>
-              <a:t>5/18/2021</a:t>
+              <a:t>5/19/2021</a:t>
             </a:fld>
             <a:endParaRPr lang="en-US" altLang="zh-CN"/>
           </a:p>
@@ -4313,7 +4346,7 @@
             <a:pPr fontAlgn="base"/>
             <a:fld id="{57ADAC95-47D6-486D-8219-12B733E6EC93}" type="datetime1">
               <a:rPr lang="en-US" altLang="zh-CN"/>
-              <a:t>5/18/2021</a:t>
+              <a:t>5/19/2021</a:t>
             </a:fld>
             <a:endParaRPr lang="en-US" altLang="zh-CN"/>
           </a:p>
@@ -4560,7 +4593,7 @@
             <a:pPr fontAlgn="base"/>
             <a:fld id="{B317AF51-22A1-40E8-BEA0-87091C1430AE}" type="datetime1">
               <a:rPr lang="en-US" altLang="zh-CN"/>
-              <a:t>5/18/2021</a:t>
+              <a:t>5/19/2021</a:t>
             </a:fld>
             <a:endParaRPr lang="en-US" altLang="zh-CN"/>
           </a:p>
@@ -4764,7 +4797,7 @@
             <a:pPr fontAlgn="base"/>
             <a:fld id="{1B70EDD4-872C-46C4-AD3D-2F2728D6D998}" type="datetime1">
               <a:rPr lang="en-US" altLang="zh-CN"/>
-              <a:t>5/18/2021</a:t>
+              <a:t>5/19/2021</a:t>
             </a:fld>
             <a:endParaRPr lang="en-US" altLang="zh-CN"/>
           </a:p>
@@ -4857,7 +4890,7 @@
             <a:pPr fontAlgn="base"/>
             <a:fld id="{8771309A-67BF-4F2C-B141-A794C5AA850F}" type="datetime1">
               <a:rPr lang="en-US" altLang="zh-CN"/>
-              <a:t>5/18/2021</a:t>
+              <a:t>5/19/2021</a:t>
             </a:fld>
             <a:endParaRPr lang="en-US" altLang="zh-CN"/>
           </a:p>

</xml_diff>